<commit_message>
experiment viscosity reading new dev added
</commit_message>
<xml_diff>
--- a/ProgTerm/Projeto_final_PIV/FinalProjectPIV.pptx
+++ b/ProgTerm/Projeto_final_PIV/FinalProjectPIV.pptx
@@ -5,10 +5,10 @@
     <p:sldMasterId id="2147483660" r:id="rId1"/>
   </p:sldMasterIdLst>
   <p:notesMasterIdLst>
-    <p:notesMasterId r:id="rId9"/>
+    <p:notesMasterId r:id="rId8"/>
   </p:notesMasterIdLst>
   <p:handoutMasterIdLst>
-    <p:handoutMasterId r:id="rId10"/>
+    <p:handoutMasterId r:id="rId9"/>
   </p:handoutMasterIdLst>
   <p:sldIdLst>
     <p:sldId id="256" r:id="rId2"/>
@@ -17,7 +17,6 @@
     <p:sldId id="695" r:id="rId5"/>
     <p:sldId id="696" r:id="rId6"/>
     <p:sldId id="697" r:id="rId7"/>
-    <p:sldId id="692" r:id="rId8"/>
   </p:sldIdLst>
   <p:sldSz cx="9144000" cy="5143500" type="screen16x9"/>
   <p:notesSz cx="6858000" cy="9144000"/>
@@ -2255,7 +2254,7 @@
               <a:rPr lang="pt-BR" sz="1200" dirty="0">
                 <a:latin typeface="Aptos" panose="020B0004020202020204" pitchFamily="34" charset="0"/>
               </a:rPr>
-              <a:t>Usar livrarias revisadas nas aulas.</a:t>
+              <a:t>Usar ferramentas revisadas nas aulas.</a:t>
             </a:r>
           </a:p>
           <a:p>
@@ -4064,11 +4063,11 @@
   <p:clrMapOvr>
     <a:masterClrMapping/>
   </p:clrMapOvr>
-  <mc:AlternateContent xmlns:mc="http://schemas.openxmlformats.org/markup-compatibility/2006">
-    <mc:Choice xmlns:p14="http://schemas.microsoft.com/office/powerpoint/2010/main" Requires="p14">
+  <mc:AlternateContent xmlns:mc="http://schemas.openxmlformats.org/markup-compatibility/2006" xmlns:p14="http://schemas.microsoft.com/office/powerpoint/2010/main">
+    <mc:Choice Requires="p14">
       <p:transition p14:dur="10"/>
     </mc:Choice>
-    <mc:Fallback>
+    <mc:Fallback xmlns="">
       <p:transition/>
     </mc:Fallback>
   </mc:AlternateContent>
@@ -5202,8 +5201,8 @@
           </a:fontRef>
         </p:style>
       </p:cxnSp>
-      <mc:AlternateContent xmlns:mc="http://schemas.openxmlformats.org/markup-compatibility/2006">
-        <mc:Choice xmlns:a14="http://schemas.microsoft.com/office/drawing/2010/main" Requires="a14">
+      <mc:AlternateContent xmlns:mc="http://schemas.openxmlformats.org/markup-compatibility/2006" xmlns:a14="http://schemas.microsoft.com/office/drawing/2010/main">
+        <mc:Choice Requires="a14">
           <p:sp>
             <p:nvSpPr>
               <p:cNvPr id="18" name="CuadroTexto 17">
@@ -5232,6 +5231,7 @@
               </a:bodyPr>
               <a:lstStyle/>
               <a:p>
+                <a:pPr/>
                 <a14:m>
                   <m:oMathPara xmlns:m="http://schemas.openxmlformats.org/officeDocument/2006/math">
                     <m:oMathParaPr>
@@ -5294,7 +5294,7 @@
             </p:txBody>
           </p:sp>
         </mc:Choice>
-        <mc:Fallback>
+        <mc:Fallback xmlns="">
           <p:sp>
             <p:nvSpPr>
               <p:cNvPr id="18" name="CuadroTexto 17">
@@ -6255,8 +6255,8 @@
           </a:p>
         </p:txBody>
       </p:sp>
-      <mc:AlternateContent xmlns:mc="http://schemas.openxmlformats.org/markup-compatibility/2006">
-        <mc:Choice xmlns:a14="http://schemas.microsoft.com/office/drawing/2010/main" Requires="a14">
+      <mc:AlternateContent xmlns:mc="http://schemas.openxmlformats.org/markup-compatibility/2006" xmlns:a14="http://schemas.microsoft.com/office/drawing/2010/main">
+        <mc:Choice Requires="a14">
           <p:sp>
             <p:nvSpPr>
               <p:cNvPr id="44" name="CuadroTexto 43">
@@ -6285,6 +6285,7 @@
               </a:bodyPr>
               <a:lstStyle/>
               <a:p>
+                <a:pPr/>
                 <a14:m>
                   <m:oMathPara xmlns:m="http://schemas.openxmlformats.org/officeDocument/2006/math">
                     <m:oMathParaPr>
@@ -6305,7 +6306,7 @@
             </p:txBody>
           </p:sp>
         </mc:Choice>
-        <mc:Fallback>
+        <mc:Fallback xmlns="">
           <p:sp>
             <p:nvSpPr>
               <p:cNvPr id="44" name="CuadroTexto 43">
@@ -6350,8 +6351,8 @@
           </p:sp>
         </mc:Fallback>
       </mc:AlternateContent>
-      <mc:AlternateContent xmlns:mc="http://schemas.openxmlformats.org/markup-compatibility/2006">
-        <mc:Choice xmlns:a14="http://schemas.microsoft.com/office/drawing/2010/main" Requires="a14">
+      <mc:AlternateContent xmlns:mc="http://schemas.openxmlformats.org/markup-compatibility/2006" xmlns:a14="http://schemas.microsoft.com/office/drawing/2010/main">
+        <mc:Choice Requires="a14">
           <p:sp>
             <p:nvSpPr>
               <p:cNvPr id="45" name="CuadroTexto 44">
@@ -6380,6 +6381,7 @@
               </a:bodyPr>
               <a:lstStyle/>
               <a:p>
+                <a:pPr/>
                 <a14:m>
                   <m:oMathPara xmlns:m="http://schemas.openxmlformats.org/officeDocument/2006/math">
                     <m:oMathParaPr>
@@ -6400,7 +6402,7 @@
             </p:txBody>
           </p:sp>
         </mc:Choice>
-        <mc:Fallback>
+        <mc:Fallback xmlns="">
           <p:sp>
             <p:nvSpPr>
               <p:cNvPr id="45" name="CuadroTexto 44">
@@ -7264,8 +7266,8 @@
           </a:p>
         </p:txBody>
       </p:sp>
-      <mc:AlternateContent xmlns:mc="http://schemas.openxmlformats.org/markup-compatibility/2006">
-        <mc:Choice xmlns:a14="http://schemas.microsoft.com/office/drawing/2010/main" Requires="a14">
+      <mc:AlternateContent xmlns:mc="http://schemas.openxmlformats.org/markup-compatibility/2006" xmlns:a14="http://schemas.microsoft.com/office/drawing/2010/main">
+        <mc:Choice Requires="a14">
           <p:sp>
             <p:nvSpPr>
               <p:cNvPr id="61" name="CuadroTexto 60">
@@ -7294,6 +7296,7 @@
               </a:bodyPr>
               <a:lstStyle/>
               <a:p>
+                <a:pPr/>
                 <a14:m>
                   <m:oMathPara xmlns:m="http://schemas.openxmlformats.org/officeDocument/2006/math">
                     <m:oMathParaPr>
@@ -7430,7 +7433,7 @@
             </p:txBody>
           </p:sp>
         </mc:Choice>
-        <mc:Fallback>
+        <mc:Fallback xmlns="">
           <p:sp>
             <p:nvSpPr>
               <p:cNvPr id="61" name="CuadroTexto 60">
@@ -7808,8 +7811,8 @@
           </a:p>
         </p:txBody>
       </p:sp>
-      <mc:AlternateContent xmlns:mc="http://schemas.openxmlformats.org/markup-compatibility/2006">
-        <mc:Choice xmlns:a14="http://schemas.microsoft.com/office/drawing/2010/main" Requires="a14">
+      <mc:AlternateContent xmlns:mc="http://schemas.openxmlformats.org/markup-compatibility/2006" xmlns:a14="http://schemas.microsoft.com/office/drawing/2010/main">
+        <mc:Choice Requires="a14">
           <p:sp>
             <p:nvSpPr>
               <p:cNvPr id="71" name="CuadroTexto 70">
@@ -7838,6 +7841,7 @@
               </a:bodyPr>
               <a:lstStyle/>
               <a:p>
+                <a:pPr/>
                 <a14:m>
                   <m:oMathPara xmlns:m="http://schemas.openxmlformats.org/officeDocument/2006/math">
                     <m:oMathParaPr>
@@ -7947,7 +7951,7 @@
             </p:txBody>
           </p:sp>
         </mc:Choice>
-        <mc:Fallback>
+        <mc:Fallback xmlns="">
           <p:sp>
             <p:nvSpPr>
               <p:cNvPr id="71" name="CuadroTexto 70">
@@ -8002,11 +8006,11 @@
   <p:clrMapOvr>
     <a:masterClrMapping/>
   </p:clrMapOvr>
-  <mc:AlternateContent xmlns:mc="http://schemas.openxmlformats.org/markup-compatibility/2006">
-    <mc:Choice xmlns:p14="http://schemas.microsoft.com/office/powerpoint/2010/main" Requires="p14">
+  <mc:AlternateContent xmlns:mc="http://schemas.openxmlformats.org/markup-compatibility/2006" xmlns:p14="http://schemas.microsoft.com/office/powerpoint/2010/main">
+    <mc:Choice Requires="p14">
       <p:transition p14:dur="10"/>
     </mc:Choice>
-    <mc:Fallback>
+    <mc:Fallback xmlns="">
       <p:transition/>
     </mc:Fallback>
   </mc:AlternateContent>
@@ -9438,11 +9442,11 @@
   <p:clrMapOvr>
     <a:masterClrMapping/>
   </p:clrMapOvr>
-  <mc:AlternateContent xmlns:mc="http://schemas.openxmlformats.org/markup-compatibility/2006">
-    <mc:Choice xmlns:p14="http://schemas.microsoft.com/office/powerpoint/2010/main" Requires="p14">
+  <mc:AlternateContent xmlns:mc="http://schemas.openxmlformats.org/markup-compatibility/2006" xmlns:p14="http://schemas.microsoft.com/office/powerpoint/2010/main">
+    <mc:Choice Requires="p14">
       <p:transition p14:dur="10"/>
     </mc:Choice>
-    <mc:Fallback>
+    <mc:Fallback xmlns="">
       <p:transition/>
     </mc:Fallback>
   </mc:AlternateContent>
@@ -10779,173 +10783,6 @@
     <p:extLst>
       <p:ext uri="{BB962C8B-B14F-4D97-AF65-F5344CB8AC3E}">
         <p14:creationId xmlns:p14="http://schemas.microsoft.com/office/powerpoint/2010/main" val="3405859070"/>
-      </p:ext>
-    </p:extLst>
-  </p:cSld>
-  <p:clrMapOvr>
-    <a:masterClrMapping/>
-  </p:clrMapOvr>
-  <mc:AlternateContent xmlns:mc="http://schemas.openxmlformats.org/markup-compatibility/2006">
-    <mc:Choice xmlns:p14="http://schemas.microsoft.com/office/powerpoint/2010/main" Requires="p14">
-      <p:transition p14:dur="10"/>
-    </mc:Choice>
-    <mc:Fallback>
-      <p:transition/>
-    </mc:Fallback>
-  </mc:AlternateContent>
-</p:sld>
-</file>
-
-<file path=ppt/slides/slide7.xml><?xml version="1.0" encoding="utf-8"?>
-<p:sld xmlns:a="http://schemas.openxmlformats.org/drawingml/2006/main" xmlns:r="http://schemas.openxmlformats.org/officeDocument/2006/relationships" xmlns:p="http://schemas.openxmlformats.org/presentationml/2006/main">
-  <p:cSld>
-    <p:spTree>
-      <p:nvGrpSpPr>
-        <p:cNvPr id="1" name="">
-          <a:extLst>
-            <a:ext uri="{FF2B5EF4-FFF2-40B4-BE49-F238E27FC236}">
-              <a16:creationId xmlns:a16="http://schemas.microsoft.com/office/drawing/2014/main" id="{968100A1-FF24-6003-965B-C33419143910}"/>
-            </a:ext>
-          </a:extLst>
-        </p:cNvPr>
-        <p:cNvGrpSpPr/>
-        <p:nvPr/>
-      </p:nvGrpSpPr>
-      <p:grpSpPr>
-        <a:xfrm>
-          <a:off x="0" y="0"/>
-          <a:ext cx="0" cy="0"/>
-          <a:chOff x="0" y="0"/>
-          <a:chExt cx="0" cy="0"/>
-        </a:xfrm>
-      </p:grpSpPr>
-      <p:sp>
-        <p:nvSpPr>
-          <p:cNvPr id="2" name="Title 1">
-            <a:extLst>
-              <a:ext uri="{FF2B5EF4-FFF2-40B4-BE49-F238E27FC236}">
-                <a16:creationId xmlns:a16="http://schemas.microsoft.com/office/drawing/2014/main" id="{9473A58C-54D2-934A-85A4-853767A62044}"/>
-              </a:ext>
-            </a:extLst>
-          </p:cNvPr>
-          <p:cNvSpPr>
-            <a:spLocks noGrp="1"/>
-          </p:cNvSpPr>
-          <p:nvPr>
-            <p:ph type="ctrTitle"/>
-          </p:nvPr>
-        </p:nvSpPr>
-        <p:spPr>
-          <a:xfrm>
-            <a:off x="859398" y="1915715"/>
-            <a:ext cx="8179827" cy="1102519"/>
-          </a:xfrm>
-        </p:spPr>
-        <p:txBody>
-          <a:bodyPr>
-            <a:noAutofit/>
-          </a:bodyPr>
-          <a:lstStyle/>
-          <a:p>
-            <a:r>
-              <a:rPr lang="pt-BR" sz="6000" dirty="0">
-                <a:solidFill>
-                  <a:schemeClr val="tx1">
-                    <a:lumMod val="75000"/>
-                    <a:lumOff val="25000"/>
-                  </a:schemeClr>
-                </a:solidFill>
-                <a:latin typeface="Aptos ExtraBold" panose="020B0004020202020204" pitchFamily="34" charset="0"/>
-              </a:rPr>
-              <a:t>Final </a:t>
-            </a:r>
-            <a:r>
-              <a:rPr lang="pt-BR" sz="6000" dirty="0" err="1">
-                <a:solidFill>
-                  <a:schemeClr val="tx1">
-                    <a:lumMod val="75000"/>
-                    <a:lumOff val="25000"/>
-                  </a:schemeClr>
-                </a:solidFill>
-                <a:latin typeface="Aptos ExtraBold" panose="020B0004020202020204" pitchFamily="34" charset="0"/>
-              </a:rPr>
-              <a:t>Remarks</a:t>
-            </a:r>
-            <a:r>
-              <a:rPr lang="pt-BR" sz="6000" dirty="0">
-                <a:solidFill>
-                  <a:schemeClr val="tx1">
-                    <a:lumMod val="75000"/>
-                    <a:lumOff val="25000"/>
-                  </a:schemeClr>
-                </a:solidFill>
-                <a:latin typeface="Aptos ExtraBold" panose="020B0004020202020204" pitchFamily="34" charset="0"/>
-              </a:rPr>
-              <a:t> &amp;</a:t>
-            </a:r>
-            <a:br>
-              <a:rPr lang="pt-BR" sz="6000" dirty="0">
-                <a:solidFill>
-                  <a:schemeClr val="tx1">
-                    <a:lumMod val="75000"/>
-                    <a:lumOff val="25000"/>
-                  </a:schemeClr>
-                </a:solidFill>
-                <a:latin typeface="Aptos ExtraBold" panose="020B0004020202020204" pitchFamily="34" charset="0"/>
-              </a:rPr>
-            </a:br>
-            <a:r>
-              <a:rPr lang="pt-BR" sz="6000" dirty="0" err="1">
-                <a:solidFill>
-                  <a:schemeClr val="tx1">
-                    <a:lumMod val="75000"/>
-                    <a:lumOff val="25000"/>
-                  </a:schemeClr>
-                </a:solidFill>
-                <a:latin typeface="Aptos ExtraBold" panose="020B0004020202020204" pitchFamily="34" charset="0"/>
-              </a:rPr>
-              <a:t>Research</a:t>
-            </a:r>
-            <a:r>
-              <a:rPr lang="pt-BR" sz="6000" dirty="0">
-                <a:solidFill>
-                  <a:schemeClr val="tx1">
-                    <a:lumMod val="75000"/>
-                    <a:lumOff val="25000"/>
-                  </a:schemeClr>
-                </a:solidFill>
-                <a:latin typeface="Aptos ExtraBold" panose="020B0004020202020204" pitchFamily="34" charset="0"/>
-              </a:rPr>
-              <a:t> </a:t>
-            </a:r>
-            <a:r>
-              <a:rPr lang="pt-BR" sz="6000" dirty="0" err="1">
-                <a:solidFill>
-                  <a:schemeClr val="tx1">
-                    <a:lumMod val="75000"/>
-                    <a:lumOff val="25000"/>
-                  </a:schemeClr>
-                </a:solidFill>
-                <a:latin typeface="Aptos ExtraBold" panose="020B0004020202020204" pitchFamily="34" charset="0"/>
-              </a:rPr>
-              <a:t>Opportunities</a:t>
-            </a:r>
-            <a:endParaRPr lang="en-US" sz="6000" b="1" noProof="0" dirty="0">
-              <a:solidFill>
-                <a:schemeClr val="tx1">
-                  <a:lumMod val="75000"/>
-                  <a:lumOff val="25000"/>
-                </a:schemeClr>
-              </a:solidFill>
-              <a:latin typeface="Aptos ExtraBold" panose="020B0004020202020204" pitchFamily="34" charset="0"/>
-            </a:endParaRPr>
-          </a:p>
-        </p:txBody>
-      </p:sp>
-    </p:spTree>
-    <p:extLst>
-      <p:ext uri="{BB962C8B-B14F-4D97-AF65-F5344CB8AC3E}">
-        <p14:creationId xmlns:p14="http://schemas.microsoft.com/office/powerpoint/2010/main" val="3252788646"/>
       </p:ext>
     </p:extLst>
   </p:cSld>

</xml_diff>